<commit_message>
Modify the README.md and material
</commit_message>
<xml_diff>
--- a/Presentation Project.pptx
+++ b/Presentation Project.pptx
@@ -15,6 +15,8 @@
     <p:sldId id="263" r:id="rId9"/>
     <p:sldId id="264" r:id="rId10"/>
     <p:sldId id="266" r:id="rId11"/>
+    <p:sldId id="267" r:id="rId12"/>
+    <p:sldId id="268" r:id="rId13"/>
   </p:sldIdLst>
   <p:sldSz cx="12192000" cy="6858000"/>
   <p:notesSz cx="6858000" cy="9144000"/>
@@ -4087,6 +4089,483 @@
 </p:sld>
 </file>
 
+<file path=ppt/slides/slide11.xml><?xml version="1.0" encoding="utf-8"?>
+<p:sld xmlns:a="http://schemas.openxmlformats.org/drawingml/2006/main" xmlns:r="http://schemas.openxmlformats.org/officeDocument/2006/relationships" xmlns:p="http://schemas.openxmlformats.org/presentationml/2006/main">
+  <p:cSld>
+    <p:bg>
+      <p:bgPr>
+        <a:solidFill>
+          <a:schemeClr val="bg1"/>
+        </a:solidFill>
+        <a:effectLst/>
+      </p:bgPr>
+    </p:bg>
+    <p:spTree>
+      <p:nvGrpSpPr>
+        <p:cNvPr id="1" name=""/>
+        <p:cNvGrpSpPr/>
+        <p:nvPr/>
+      </p:nvGrpSpPr>
+      <p:grpSpPr>
+        <a:xfrm>
+          <a:off x="0" y="0"/>
+          <a:ext cx="0" cy="0"/>
+          <a:chOff x="0" y="0"/>
+          <a:chExt cx="0" cy="0"/>
+        </a:xfrm>
+      </p:grpSpPr>
+      <p:sp useBgFill="1">
+        <p:nvSpPr>
+          <p:cNvPr id="39" name="Rectangle 38">
+            <a:extLst>
+              <a:ext uri="{FF2B5EF4-FFF2-40B4-BE49-F238E27FC236}">
+                <a16:creationId xmlns:a16="http://schemas.microsoft.com/office/drawing/2014/main" id="{9D25F302-27C5-414F-97F8-6EA0A6C028BA}"/>
+              </a:ext>
+              <a:ext uri="{C183D7F6-B498-43B3-948B-1728B52AA6E4}">
+                <adec:decorative xmlns:adec="http://schemas.microsoft.com/office/drawing/2017/decorative" val="1"/>
+              </a:ext>
+            </a:extLst>
+          </p:cNvPr>
+          <p:cNvSpPr>
+            <a:spLocks noGrp="1" noRot="1" noChangeAspect="1" noMove="1" noResize="1" noEditPoints="1" noAdjustHandles="1" noChangeArrowheads="1" noChangeShapeType="1" noTextEdit="1"/>
+          </p:cNvSpPr>
+          <p:nvPr>
+            <p:extLst>
+              <p:ext uri="{386F3935-93C4-4BCD-93E2-E3B085C9AB24}">
+                <p16:designElem xmlns:p16="http://schemas.microsoft.com/office/powerpoint/2015/main" val="1"/>
+              </p:ext>
+            </p:extLst>
+          </p:nvPr>
+        </p:nvSpPr>
+        <p:spPr>
+          <a:xfrm>
+            <a:off x="0" y="0"/>
+            <a:ext cx="12192000" cy="6858000"/>
+          </a:xfrm>
+          <a:prstGeom prst="rect">
+            <a:avLst/>
+          </a:prstGeom>
+          <a:ln>
+            <a:noFill/>
+          </a:ln>
+        </p:spPr>
+        <p:style>
+          <a:lnRef idx="2">
+            <a:schemeClr val="accent1">
+              <a:shade val="50000"/>
+            </a:schemeClr>
+          </a:lnRef>
+          <a:fillRef idx="1">
+            <a:schemeClr val="accent1"/>
+          </a:fillRef>
+          <a:effectRef idx="0">
+            <a:schemeClr val="accent1"/>
+          </a:effectRef>
+          <a:fontRef idx="minor">
+            <a:schemeClr val="lt1"/>
+          </a:fontRef>
+        </p:style>
+        <p:txBody>
+          <a:bodyPr rtlCol="0" anchor="ctr"/>
+          <a:lstStyle/>
+          <a:p>
+            <a:pPr algn="ctr"/>
+            <a:endParaRPr lang="en-US"/>
+          </a:p>
+        </p:txBody>
+      </p:sp>
+      <p:pic>
+        <p:nvPicPr>
+          <p:cNvPr id="36" name="Graphic 35" descr="Server">
+            <a:extLst>
+              <a:ext uri="{FF2B5EF4-FFF2-40B4-BE49-F238E27FC236}">
+                <a16:creationId xmlns:a16="http://schemas.microsoft.com/office/drawing/2014/main" id="{6332D341-BC58-15EC-3E9D-8A911251732E}"/>
+              </a:ext>
+            </a:extLst>
+          </p:cNvPr>
+          <p:cNvPicPr>
+            <a:picLocks noChangeAspect="1"/>
+          </p:cNvPicPr>
+          <p:nvPr/>
+        </p:nvPicPr>
+        <p:blipFill>
+          <a:blip r:embed="rId2">
+            <a:extLst>
+              <a:ext uri="{28A0092B-C50C-407E-A947-70E740481C1C}">
+                <a14:useLocalDpi xmlns:a14="http://schemas.microsoft.com/office/drawing/2010/main" val="0"/>
+              </a:ext>
+              <a:ext uri="{96DAC541-7B7A-43D3-8B79-37D633B846F1}">
+                <asvg:svgBlip xmlns:asvg="http://schemas.microsoft.com/office/drawing/2016/SVG/main" r:embed="rId3"/>
+              </a:ext>
+            </a:extLst>
+          </a:blip>
+          <a:stretch>
+            <a:fillRect/>
+          </a:stretch>
+        </p:blipFill>
+        <p:spPr>
+          <a:xfrm>
+            <a:off x="621675" y="690054"/>
+            <a:ext cx="5474323" cy="5474323"/>
+          </a:xfrm>
+          <a:prstGeom prst="rect">
+            <a:avLst/>
+          </a:prstGeom>
+        </p:spPr>
+      </p:pic>
+      <p:sp>
+        <p:nvSpPr>
+          <p:cNvPr id="41" name="Right Triangle 40">
+            <a:extLst>
+              <a:ext uri="{FF2B5EF4-FFF2-40B4-BE49-F238E27FC236}">
+                <a16:creationId xmlns:a16="http://schemas.microsoft.com/office/drawing/2014/main" id="{830A36F8-48C2-4842-A87B-8CE8DF4E7FD2}"/>
+              </a:ext>
+              <a:ext uri="{C183D7F6-B498-43B3-948B-1728B52AA6E4}">
+                <adec:decorative xmlns:adec="http://schemas.microsoft.com/office/drawing/2017/decorative" val="1"/>
+              </a:ext>
+            </a:extLst>
+          </p:cNvPr>
+          <p:cNvSpPr>
+            <a:spLocks noGrp="1" noRot="1" noChangeAspect="1" noMove="1" noResize="1" noEditPoints="1" noAdjustHandles="1" noChangeArrowheads="1" noChangeShapeType="1" noTextEdit="1"/>
+          </p:cNvSpPr>
+          <p:nvPr>
+            <p:extLst>
+              <p:ext uri="{386F3935-93C4-4BCD-93E2-E3B085C9AB24}">
+                <p16:designElem xmlns:p16="http://schemas.microsoft.com/office/powerpoint/2015/main" val="1"/>
+              </p:ext>
+            </p:extLst>
+          </p:nvPr>
+        </p:nvSpPr>
+        <p:spPr>
+          <a:xfrm flipH="1">
+            <a:off x="8576720" y="3335867"/>
+            <a:ext cx="3291840" cy="3200400"/>
+          </a:xfrm>
+          <a:prstGeom prst="rtTriangle">
+            <a:avLst/>
+          </a:prstGeom>
+          <a:solidFill>
+            <a:schemeClr val="accent4"/>
+          </a:solidFill>
+          <a:ln>
+            <a:noFill/>
+          </a:ln>
+        </p:spPr>
+        <p:style>
+          <a:lnRef idx="2">
+            <a:schemeClr val="accent1">
+              <a:shade val="50000"/>
+            </a:schemeClr>
+          </a:lnRef>
+          <a:fillRef idx="1">
+            <a:schemeClr val="accent1"/>
+          </a:fillRef>
+          <a:effectRef idx="0">
+            <a:schemeClr val="accent1"/>
+          </a:effectRef>
+          <a:fontRef idx="minor">
+            <a:schemeClr val="lt1"/>
+          </a:fontRef>
+        </p:style>
+        <p:txBody>
+          <a:bodyPr rtlCol="0" anchor="ctr"/>
+          <a:lstStyle/>
+          <a:p>
+            <a:pPr algn="ctr"/>
+            <a:endParaRPr lang="en-US" dirty="0"/>
+          </a:p>
+        </p:txBody>
+      </p:sp>
+      <p:sp>
+        <p:nvSpPr>
+          <p:cNvPr id="43" name="Rectangle 42">
+            <a:extLst>
+              <a:ext uri="{FF2B5EF4-FFF2-40B4-BE49-F238E27FC236}">
+                <a16:creationId xmlns:a16="http://schemas.microsoft.com/office/drawing/2014/main" id="{086A5A31-B10A-4793-84D4-D785959AE5B8}"/>
+              </a:ext>
+              <a:ext uri="{C183D7F6-B498-43B3-948B-1728B52AA6E4}">
+                <adec:decorative xmlns:adec="http://schemas.microsoft.com/office/drawing/2017/decorative" val="1"/>
+              </a:ext>
+            </a:extLst>
+          </p:cNvPr>
+          <p:cNvSpPr>
+            <a:spLocks noGrp="1" noRot="1" noChangeAspect="1" noMove="1" noResize="1" noEditPoints="1" noAdjustHandles="1" noChangeArrowheads="1" noChangeShapeType="1" noTextEdit="1"/>
+          </p:cNvSpPr>
+          <p:nvPr>
+            <p:extLst>
+              <p:ext uri="{386F3935-93C4-4BCD-93E2-E3B085C9AB24}">
+                <p16:designElem xmlns:p16="http://schemas.microsoft.com/office/powerpoint/2015/main" val="1"/>
+              </p:ext>
+            </p:extLst>
+          </p:nvPr>
+        </p:nvSpPr>
+        <p:spPr>
+          <a:xfrm>
+            <a:off x="6405201" y="623275"/>
+            <a:ext cx="5141626" cy="5607882"/>
+          </a:xfrm>
+          <a:prstGeom prst="rect">
+            <a:avLst/>
+          </a:prstGeom>
+          <a:noFill/>
+          <a:ln w="19050">
+            <a:solidFill>
+              <a:schemeClr val="tx1">
+                <a:lumMod val="75000"/>
+                <a:lumOff val="25000"/>
+              </a:schemeClr>
+            </a:solidFill>
+          </a:ln>
+        </p:spPr>
+        <p:style>
+          <a:lnRef idx="2">
+            <a:schemeClr val="accent1">
+              <a:shade val="50000"/>
+            </a:schemeClr>
+          </a:lnRef>
+          <a:fillRef idx="1">
+            <a:schemeClr val="accent1"/>
+          </a:fillRef>
+          <a:effectRef idx="0">
+            <a:schemeClr val="accent1"/>
+          </a:effectRef>
+          <a:fontRef idx="minor">
+            <a:schemeClr val="lt1"/>
+          </a:fontRef>
+        </p:style>
+        <p:txBody>
+          <a:bodyPr rtlCol="0" anchor="ctr"/>
+          <a:lstStyle/>
+          <a:p>
+            <a:pPr algn="ctr"/>
+            <a:endParaRPr lang="en-US"/>
+          </a:p>
+        </p:txBody>
+      </p:sp>
+      <p:sp>
+        <p:nvSpPr>
+          <p:cNvPr id="6" name="Titolo 1">
+            <a:extLst>
+              <a:ext uri="{FF2B5EF4-FFF2-40B4-BE49-F238E27FC236}">
+                <a16:creationId xmlns:a16="http://schemas.microsoft.com/office/drawing/2014/main" id="{9FF74128-9ADC-F3BD-CEEC-8FDC1F6C45E1}"/>
+              </a:ext>
+            </a:extLst>
+          </p:cNvPr>
+          <p:cNvSpPr>
+            <a:spLocks noGrp="1"/>
+          </p:cNvSpPr>
+          <p:nvPr>
+            <p:ph type="title"/>
+          </p:nvPr>
+        </p:nvSpPr>
+        <p:spPr>
+          <a:xfrm>
+            <a:off x="6889833" y="1188637"/>
+            <a:ext cx="4218138" cy="1597228"/>
+          </a:xfrm>
+        </p:spPr>
+        <p:txBody>
+          <a:bodyPr vert="horz" lIns="91440" tIns="45720" rIns="91440" bIns="45720" rtlCol="0" anchor="ctr">
+            <a:normAutofit/>
+          </a:bodyPr>
+          <a:lstStyle/>
+          <a:p>
+            <a:r>
+              <a:rPr lang="en-US" sz="5400" kern="1200">
+                <a:solidFill>
+                  <a:schemeClr val="tx1"/>
+                </a:solidFill>
+                <a:latin typeface="+mj-lt"/>
+                <a:ea typeface="+mj-ea"/>
+                <a:cs typeface="+mj-cs"/>
+              </a:rPr>
+              <a:t>System</a:t>
+            </a:r>
+          </a:p>
+        </p:txBody>
+      </p:sp>
+      <p:sp>
+        <p:nvSpPr>
+          <p:cNvPr id="2" name="CasellaDiTesto 1">
+            <a:extLst>
+              <a:ext uri="{FF2B5EF4-FFF2-40B4-BE49-F238E27FC236}">
+                <a16:creationId xmlns:a16="http://schemas.microsoft.com/office/drawing/2014/main" id="{D8E34547-BABA-94CD-A074-8D0D0AE2D1A2}"/>
+              </a:ext>
+            </a:extLst>
+          </p:cNvPr>
+          <p:cNvSpPr txBox="1"/>
+          <p:nvPr/>
+        </p:nvSpPr>
+        <p:spPr>
+          <a:xfrm>
+            <a:off x="6889832" y="2998277"/>
+            <a:ext cx="4114773" cy="2671085"/>
+          </a:xfrm>
+          <a:prstGeom prst="rect">
+            <a:avLst/>
+          </a:prstGeom>
+        </p:spPr>
+        <p:txBody>
+          <a:bodyPr vert="horz" lIns="91440" tIns="45720" rIns="91440" bIns="45720" rtlCol="0" anchor="t">
+            <a:normAutofit/>
+          </a:bodyPr>
+          <a:lstStyle/>
+          <a:p>
+            <a:pPr indent="-228600">
+              <a:lnSpc>
+                <a:spcPct val="90000"/>
+              </a:lnSpc>
+              <a:spcAft>
+                <a:spcPts val="600"/>
+              </a:spcAft>
+              <a:buFont typeface="Arial" panose="020B0604020202020204" pitchFamily="34" charset="0"/>
+              <a:buChar char="•"/>
+            </a:pPr>
+            <a:r>
+              <a:rPr lang="en-US" sz="1400" dirty="0"/>
+              <a:t>The cluster with this configuration has a single node. </a:t>
+            </a:r>
+          </a:p>
+          <a:p>
+            <a:pPr indent="-228600">
+              <a:lnSpc>
+                <a:spcPct val="90000"/>
+              </a:lnSpc>
+              <a:spcAft>
+                <a:spcPts val="600"/>
+              </a:spcAft>
+              <a:buFont typeface="Arial" panose="020B0604020202020204" pitchFamily="34" charset="0"/>
+              <a:buChar char="•"/>
+            </a:pPr>
+            <a:r>
+              <a:rPr lang="en-US" sz="1400" dirty="0"/>
+              <a:t>The entire system includes:</a:t>
+            </a:r>
+          </a:p>
+          <a:p>
+            <a:pPr lvl="1" indent="-228600">
+              <a:lnSpc>
+                <a:spcPct val="90000"/>
+              </a:lnSpc>
+              <a:spcAft>
+                <a:spcPts val="600"/>
+              </a:spcAft>
+              <a:buFont typeface="Arial" panose="020B0604020202020204" pitchFamily="34" charset="0"/>
+              <a:buChar char="•"/>
+            </a:pPr>
+            <a:r>
+              <a:rPr lang="en-US" sz="1400" dirty="0"/>
+              <a:t>A MySQL pod that saves everything to storage.</a:t>
+            </a:r>
+          </a:p>
+          <a:p>
+            <a:pPr lvl="1" indent="-228600">
+              <a:lnSpc>
+                <a:spcPct val="90000"/>
+              </a:lnSpc>
+              <a:spcAft>
+                <a:spcPts val="600"/>
+              </a:spcAft>
+              <a:buFont typeface="Arial" panose="020B0604020202020204" pitchFamily="34" charset="0"/>
+              <a:buChar char="•"/>
+            </a:pPr>
+            <a:r>
+              <a:rPr lang="en-US" sz="1400" dirty="0"/>
+              <a:t>A Spring Boot application (</a:t>
+            </a:r>
+            <a:r>
+              <a:rPr lang="it-IT" sz="1400" dirty="0"/>
+              <a:t>app-deployment)</a:t>
+            </a:r>
+            <a:r>
+              <a:rPr lang="en-US" sz="1400" dirty="0"/>
+              <a:t> that requests information from MySQL and a Blockchain API.</a:t>
+            </a:r>
+          </a:p>
+        </p:txBody>
+      </p:sp>
+    </p:spTree>
+    <p:extLst>
+      <p:ext uri="{BB962C8B-B14F-4D97-AF65-F5344CB8AC3E}">
+        <p14:creationId xmlns:p14="http://schemas.microsoft.com/office/powerpoint/2010/main" val="355848577"/>
+      </p:ext>
+    </p:extLst>
+  </p:cSld>
+  <p:clrMapOvr>
+    <a:masterClrMapping/>
+  </p:clrMapOvr>
+</p:sld>
+</file>
+
+<file path=ppt/slides/slide12.xml><?xml version="1.0" encoding="utf-8"?>
+<p:sld xmlns:a="http://schemas.openxmlformats.org/drawingml/2006/main" xmlns:r="http://schemas.openxmlformats.org/officeDocument/2006/relationships" xmlns:p="http://schemas.openxmlformats.org/presentationml/2006/main">
+  <p:cSld>
+    <p:bg>
+      <p:bgPr>
+        <a:solidFill>
+          <a:schemeClr val="bg1"/>
+        </a:solidFill>
+        <a:effectLst/>
+      </p:bgPr>
+    </p:bg>
+    <p:spTree>
+      <p:nvGrpSpPr>
+        <p:cNvPr id="1" name=""/>
+        <p:cNvGrpSpPr/>
+        <p:nvPr/>
+      </p:nvGrpSpPr>
+      <p:grpSpPr>
+        <a:xfrm>
+          <a:off x="0" y="0"/>
+          <a:ext cx="0" cy="0"/>
+          <a:chOff x="0" y="0"/>
+          <a:chExt cx="0" cy="0"/>
+        </a:xfrm>
+      </p:grpSpPr>
+      <p:pic>
+        <p:nvPicPr>
+          <p:cNvPr id="5" name="Segnaposto contenuto 4">
+            <a:extLst>
+              <a:ext uri="{FF2B5EF4-FFF2-40B4-BE49-F238E27FC236}">
+                <a16:creationId xmlns:a16="http://schemas.microsoft.com/office/drawing/2014/main" id="{0A63270E-EEE4-7BAB-AABA-F1AA6F5701C7}"/>
+              </a:ext>
+            </a:extLst>
+          </p:cNvPr>
+          <p:cNvPicPr>
+            <a:picLocks noGrp="1" noChangeAspect="1"/>
+          </p:cNvPicPr>
+          <p:nvPr>
+            <p:ph idx="1"/>
+          </p:nvPr>
+        </p:nvPicPr>
+        <p:blipFill rotWithShape="1">
+          <a:blip r:embed="rId2"/>
+          <a:srcRect r="390"/>
+          <a:stretch/>
+        </p:blipFill>
+        <p:spPr>
+          <a:xfrm>
+            <a:off x="-6588" y="10"/>
+            <a:ext cx="12198588" cy="6857990"/>
+          </a:xfrm>
+          <a:prstGeom prst="rect">
+            <a:avLst/>
+          </a:prstGeom>
+        </p:spPr>
+      </p:pic>
+    </p:spTree>
+    <p:extLst>
+      <p:ext uri="{BB962C8B-B14F-4D97-AF65-F5344CB8AC3E}">
+        <p14:creationId xmlns:p14="http://schemas.microsoft.com/office/powerpoint/2010/main" val="1144349726"/>
+      </p:ext>
+    </p:extLst>
+  </p:cSld>
+  <p:clrMapOvr>
+    <a:masterClrMapping/>
+  </p:clrMapOvr>
+</p:sld>
+</file>
+
 <file path=ppt/slides/slide2.xml><?xml version="1.0" encoding="utf-8"?>
 <p:sld xmlns:a="http://schemas.openxmlformats.org/drawingml/2006/main" xmlns:r="http://schemas.openxmlformats.org/officeDocument/2006/relationships" xmlns:p="http://schemas.openxmlformats.org/presentationml/2006/main">
   <p:cSld>
@@ -4696,7 +5175,7 @@
           <a:lstStyle/>
           <a:p>
             <a:r>
-              <a:rPr lang="it-IT" sz="2000"/>
+              <a:rPr lang="it-IT" sz="2000" dirty="0"/>
               <a:t>Spring Boot è un progetto nel vasto ecosistema di Spring che mira a semplificare il processo di configurazione e pubblicazione delle applicazioni basate su Spring. È un framework open source utilizzato per creare applicazioni stand-alone basate su Java che si possono eseguire con il minimo sforzo di configurazione.</a:t>
             </a:r>
           </a:p>

</xml_diff>